<commit_message>
need to rerun some data files for 2016 Mass fit
</commit_message>
<xml_diff>
--- a/Weekly Meetings/HEP_Weekly_30Sept2020.pptx
+++ b/Weekly Meetings/HEP_Weekly_30Sept2020.pptx
@@ -236,7 +236,7 @@
           <a:p>
             <a:fld id="{EC97F6CE-C9BA-5B44-AF0F-C73B1C17650F}" type="datetime1">
               <a:rPr lang="en-US" smtClean="0"/>
-              <a:t>9/29/20</a:t>
+              <a:t>9/30/20</a:t>
             </a:fld>
             <a:endParaRPr lang="en-GB"/>
           </a:p>
@@ -442,7 +442,7 @@
           <a:p>
             <a:fld id="{7F9D4A26-E586-E648-884B-C9B1EA03133F}" type="datetime1">
               <a:rPr lang="en-US" smtClean="0"/>
-              <a:t>9/29/20</a:t>
+              <a:t>9/30/20</a:t>
             </a:fld>
             <a:endParaRPr lang="en-GB"/>
           </a:p>
@@ -776,7 +776,7 @@
           <a:p>
             <a:fld id="{33D9703A-F6B0-E34C-B7F9-5A8864FF4F07}" type="datetime1">
               <a:rPr lang="en-US" smtClean="0"/>
-              <a:t>9/29/20</a:t>
+              <a:t>9/30/20</a:t>
             </a:fld>
             <a:endParaRPr lang="en-GB"/>
           </a:p>
@@ -1044,7 +1044,7 @@
           <a:p>
             <a:fld id="{DC51A3BE-CA11-4547-A39A-766971096B34}" type="datetime1">
               <a:rPr lang="en-US" smtClean="0"/>
-              <a:t>9/29/20</a:t>
+              <a:t>9/30/20</a:t>
             </a:fld>
             <a:endParaRPr lang="en-US" dirty="0"/>
           </a:p>
@@ -1251,7 +1251,7 @@
           <a:p>
             <a:fld id="{42B2CF9A-A7BF-1245-99D9-4054301C36E0}" type="datetime1">
               <a:rPr lang="en-US" smtClean="0"/>
-              <a:t>9/29/20</a:t>
+              <a:t>9/30/20</a:t>
             </a:fld>
             <a:endParaRPr lang="en-US" dirty="0"/>
           </a:p>
@@ -1506,7 +1506,7 @@
           <a:p>
             <a:fld id="{F88F3968-5050-1740-9AB7-A06844E87E5F}" type="datetime1">
               <a:rPr lang="en-US" smtClean="0"/>
-              <a:t>9/29/20</a:t>
+              <a:t>9/30/20</a:t>
             </a:fld>
             <a:endParaRPr lang="en-US" dirty="0"/>
           </a:p>
@@ -1697,7 +1697,7 @@
           <a:p>
             <a:fld id="{6A19A844-E33A-B644-A0FB-7455E93D924C}" type="datetime1">
               <a:rPr lang="en-US" smtClean="0"/>
-              <a:t>9/29/20</a:t>
+              <a:t>9/30/20</a:t>
             </a:fld>
             <a:endParaRPr lang="en-GB"/>
           </a:p>
@@ -1871,7 +1871,7 @@
           <a:p>
             <a:fld id="{F61E92BF-DA59-B546-88AE-9835521A3798}" type="datetime1">
               <a:rPr lang="en-US" smtClean="0"/>
-              <a:t>9/29/20</a:t>
+              <a:t>9/30/20</a:t>
             </a:fld>
             <a:endParaRPr lang="en-GB"/>
           </a:p>
@@ -2121,7 +2121,7 @@
           <a:p>
             <a:fld id="{61C78CAC-926A-EF4D-9608-460C3A301243}" type="datetime1">
               <a:rPr lang="en-US" smtClean="0"/>
-              <a:t>9/29/20</a:t>
+              <a:t>9/30/20</a:t>
             </a:fld>
             <a:endParaRPr lang="en-GB"/>
           </a:p>
@@ -2357,7 +2357,7 @@
           <a:p>
             <a:fld id="{32675A6D-6B9B-6546-A3DC-004E809EED54}" type="datetime1">
               <a:rPr lang="en-US" smtClean="0"/>
-              <a:t>9/29/20</a:t>
+              <a:t>9/30/20</a:t>
             </a:fld>
             <a:endParaRPr lang="en-GB"/>
           </a:p>
@@ -2728,7 +2728,7 @@
           <a:p>
             <a:fld id="{55D89806-B328-B147-9EC9-15D0307996ED}" type="datetime1">
               <a:rPr lang="en-US" smtClean="0"/>
-              <a:t>9/29/20</a:t>
+              <a:t>9/30/20</a:t>
             </a:fld>
             <a:endParaRPr lang="en-GB"/>
           </a:p>
@@ -2850,7 +2850,7 @@
           <a:p>
             <a:fld id="{702FE0D6-14B8-A94B-B441-7BA984189CE2}" type="datetime1">
               <a:rPr lang="en-US" smtClean="0"/>
-              <a:t>9/29/20</a:t>
+              <a:t>9/30/20</a:t>
             </a:fld>
             <a:endParaRPr lang="en-GB"/>
           </a:p>
@@ -2949,7 +2949,7 @@
           <a:p>
             <a:fld id="{4C294EA8-7AEB-3247-9A81-8483D03B0462}" type="datetime1">
               <a:rPr lang="en-US" smtClean="0"/>
-              <a:t>9/29/20</a:t>
+              <a:t>9/30/20</a:t>
             </a:fld>
             <a:endParaRPr lang="en-GB"/>
           </a:p>
@@ -3230,7 +3230,7 @@
           <a:p>
             <a:fld id="{D72E9315-386E-6846-8498-4330F1BBFC0A}" type="datetime1">
               <a:rPr lang="en-US" smtClean="0"/>
-              <a:t>9/29/20</a:t>
+              <a:t>9/30/20</a:t>
             </a:fld>
             <a:endParaRPr lang="en-GB"/>
           </a:p>
@@ -3386,7 +3386,7 @@
           <a:p>
             <a:fld id="{0E394EB9-E681-C34A-89D4-D81E4C62EA5B}" type="datetime1">
               <a:rPr lang="en-US" smtClean="0"/>
-              <a:t>9/29/20</a:t>
+              <a:t>9/30/20</a:t>
             </a:fld>
             <a:endParaRPr lang="en-US" dirty="0"/>
           </a:p>
@@ -3667,7 +3667,7 @@
           <a:p>
             <a:fld id="{E220BF5D-E794-2B42-91EC-2A3B4450069D}" type="datetime1">
               <a:rPr lang="en-US" smtClean="0"/>
-              <a:t>9/29/20</a:t>
+              <a:t>9/30/20</a:t>
             </a:fld>
             <a:endParaRPr lang="en-GB"/>
           </a:p>
@@ -3841,7 +3841,7 @@
           <a:p>
             <a:fld id="{BA4C039E-7082-7D42-AA91-9FF3EF6ADB5B}" type="datetime1">
               <a:rPr lang="en-US" smtClean="0"/>
-              <a:t>9/29/20</a:t>
+              <a:t>9/30/20</a:t>
             </a:fld>
             <a:endParaRPr lang="en-GB"/>
           </a:p>
@@ -4025,7 +4025,7 @@
           <a:p>
             <a:fld id="{2817B3FE-3894-A848-8D78-14007FB2FF94}" type="datetime1">
               <a:rPr lang="en-US" smtClean="0"/>
-              <a:t>9/29/20</a:t>
+              <a:t>9/30/20</a:t>
             </a:fld>
             <a:endParaRPr lang="en-GB"/>
           </a:p>
@@ -4372,7 +4372,7 @@
           <a:p>
             <a:fld id="{2DEEC64B-3E48-2F44-A6A9-A1C06A2C021E}" type="datetime1">
               <a:rPr lang="en-US" smtClean="0"/>
-              <a:t>9/29/20</a:t>
+              <a:t>9/30/20</a:t>
             </a:fld>
             <a:endParaRPr lang="en-US" dirty="0"/>
           </a:p>
@@ -4646,7 +4646,7 @@
           <a:p>
             <a:fld id="{61E195D8-183A-7F4D-8D17-8ADC90214B8A}" type="datetime1">
               <a:rPr lang="en-US" smtClean="0"/>
-              <a:t>9/29/20</a:t>
+              <a:t>9/30/20</a:t>
             </a:fld>
             <a:endParaRPr lang="en-US" dirty="0"/>
           </a:p>
@@ -5024,7 +5024,7 @@
           <a:p>
             <a:fld id="{0DD0A991-48AE-1D43-8113-23F8EAF6681B}" type="datetime1">
               <a:rPr lang="en-US" smtClean="0"/>
-              <a:t>9/29/20</a:t>
+              <a:t>9/30/20</a:t>
             </a:fld>
             <a:endParaRPr lang="en-US" dirty="0"/>
           </a:p>
@@ -5141,7 +5141,7 @@
           <a:p>
             <a:fld id="{DC12579A-EC7F-EB4A-BC5C-80733D051D29}" type="datetime1">
               <a:rPr lang="en-US" smtClean="0"/>
-              <a:t>9/29/20</a:t>
+              <a:t>9/30/20</a:t>
             </a:fld>
             <a:endParaRPr lang="en-US" dirty="0"/>
           </a:p>
@@ -5311,7 +5311,7 @@
           <a:p>
             <a:fld id="{669454CD-6DAB-7942-9B1D-8F3E2B882464}" type="datetime1">
               <a:rPr lang="en-US" smtClean="0"/>
-              <a:t>9/29/20</a:t>
+              <a:t>9/30/20</a:t>
             </a:fld>
             <a:endParaRPr lang="en-US" dirty="0"/>
           </a:p>
@@ -5695,7 +5695,7 @@
           <a:p>
             <a:fld id="{BD2CAD36-D42B-D445-A707-AA59905C7768}" type="datetime1">
               <a:rPr lang="en-US" smtClean="0"/>
-              <a:t>9/29/20</a:t>
+              <a:t>9/30/20</a:t>
             </a:fld>
             <a:endParaRPr lang="en-US" dirty="0"/>
           </a:p>
@@ -6077,7 +6077,7 @@
           <a:p>
             <a:fld id="{2D1D63B8-BB32-E649-92D4-94351543394C}" type="datetime1">
               <a:rPr lang="en-US" smtClean="0"/>
-              <a:t>9/29/20</a:t>
+              <a:t>9/30/20</a:t>
             </a:fld>
             <a:endParaRPr lang="en-US" dirty="0"/>
           </a:p>
@@ -6363,7 +6363,7 @@
           <a:p>
             <a:fld id="{FD02AE22-A9EA-FE42-BAB8-AD1D7606FF2E}" type="datetime1">
               <a:rPr lang="en-US" smtClean="0"/>
-              <a:t>9/29/20</a:t>
+              <a:t>9/30/20</a:t>
             </a:fld>
             <a:endParaRPr lang="en-US" dirty="0"/>
           </a:p>
@@ -7053,7 +7053,7 @@
           <a:p>
             <a:fld id="{307A731C-B4EF-644F-8FDB-2EBA3EC9415A}" type="datetime1">
               <a:rPr lang="en-US" smtClean="0"/>
-              <a:t>9/29/20</a:t>
+              <a:t>9/30/20</a:t>
             </a:fld>
             <a:endParaRPr lang="en-GB"/>
           </a:p>
@@ -7754,7 +7754,7 @@
           <a:p>
             <a:fld id="{3DBB7BD0-9B8D-1F47-8ABF-BE3CF9BD2848}" type="datetime1">
               <a:rPr lang="en-US" smtClean="0"/>
-              <a:t>9/29/20</a:t>
+              <a:t>9/30/20</a:t>
             </a:fld>
             <a:endParaRPr lang="en-US" dirty="0"/>
           </a:p>
@@ -8633,7 +8633,7 @@
           <a:p>
             <a:fld id="{3DBB7BD0-9B8D-1F47-8ABF-BE3CF9BD2848}" type="datetime1">
               <a:rPr lang="en-US" smtClean="0"/>
-              <a:t>9/29/20</a:t>
+              <a:t>9/30/20</a:t>
             </a:fld>
             <a:endParaRPr lang="en-US" dirty="0"/>
           </a:p>
@@ -13347,10 +13347,10 @@
       </p:sp>
       <p:pic>
         <p:nvPicPr>
-          <p:cNvPr id="4" name="Picture 3">
+          <p:cNvPr id="9" name="Picture 8">
             <a:extLst>
               <a:ext uri="{FF2B5EF4-FFF2-40B4-BE49-F238E27FC236}">
-                <a16:creationId xmlns:a16="http://schemas.microsoft.com/office/drawing/2014/main" id="{4190D677-88AF-EB4A-8675-E7900BE2B6F1}"/>
+                <a16:creationId xmlns:a16="http://schemas.microsoft.com/office/drawing/2014/main" id="{ACD6CB4B-4EEA-B64F-9DD4-9B2038F10A45}"/>
               </a:ext>
             </a:extLst>
           </p:cNvPr>
@@ -13367,7 +13367,7 @@
         </p:blipFill>
         <p:spPr>
           <a:xfrm rot="5400000">
-            <a:off x="852805" y="368617"/>
+            <a:off x="6924040" y="368616"/>
             <a:ext cx="4415155" cy="6120765"/>
           </a:xfrm>
           <a:prstGeom prst="rect">
@@ -13377,10 +13377,10 @@
       </p:pic>
       <p:pic>
         <p:nvPicPr>
-          <p:cNvPr id="9" name="Picture 8">
+          <p:cNvPr id="5" name="Picture 4">
             <a:extLst>
               <a:ext uri="{FF2B5EF4-FFF2-40B4-BE49-F238E27FC236}">
-                <a16:creationId xmlns:a16="http://schemas.microsoft.com/office/drawing/2014/main" id="{ACD6CB4B-4EEA-B64F-9DD4-9B2038F10A45}"/>
+                <a16:creationId xmlns:a16="http://schemas.microsoft.com/office/drawing/2014/main" id="{C934AFEA-9A00-EF4B-B1E7-BA6FDA40C7DE}"/>
               </a:ext>
             </a:extLst>
           </p:cNvPr>
@@ -13397,8 +13397,8 @@
         </p:blipFill>
         <p:spPr>
           <a:xfrm rot="5400000">
-            <a:off x="6924040" y="368616"/>
-            <a:ext cx="4415155" cy="6120765"/>
+            <a:off x="951991" y="440624"/>
+            <a:ext cx="4311269" cy="5976747"/>
           </a:xfrm>
           <a:prstGeom prst="rect">
             <a:avLst/>
@@ -13563,10 +13563,10 @@
       </p:sp>
       <p:pic>
         <p:nvPicPr>
-          <p:cNvPr id="6" name="Picture 5">
+          <p:cNvPr id="5" name="Picture 4">
             <a:extLst>
               <a:ext uri="{FF2B5EF4-FFF2-40B4-BE49-F238E27FC236}">
-                <a16:creationId xmlns:a16="http://schemas.microsoft.com/office/drawing/2014/main" id="{9FE20469-0CAA-5948-91A2-1E8DA636288A}"/>
+                <a16:creationId xmlns:a16="http://schemas.microsoft.com/office/drawing/2014/main" id="{BA48FAB6-19D5-A448-B20C-E958AC55D482}"/>
               </a:ext>
             </a:extLst>
           </p:cNvPr>
@@ -13583,7 +13583,7 @@
         </p:blipFill>
         <p:spPr>
           <a:xfrm rot="5400000">
-            <a:off x="832739" y="440626"/>
+            <a:off x="6928738" y="440625"/>
             <a:ext cx="4311269" cy="5976747"/>
           </a:xfrm>
           <a:prstGeom prst="rect">
@@ -13593,10 +13593,10 @@
       </p:pic>
       <p:pic>
         <p:nvPicPr>
-          <p:cNvPr id="5" name="Picture 4">
+          <p:cNvPr id="4" name="Picture 3">
             <a:extLst>
               <a:ext uri="{FF2B5EF4-FFF2-40B4-BE49-F238E27FC236}">
-                <a16:creationId xmlns:a16="http://schemas.microsoft.com/office/drawing/2014/main" id="{BA48FAB6-19D5-A448-B20C-E958AC55D482}"/>
+                <a16:creationId xmlns:a16="http://schemas.microsoft.com/office/drawing/2014/main" id="{5EAB4936-27A7-5C42-B1ED-0F433F39AFAA}"/>
               </a:ext>
             </a:extLst>
           </p:cNvPr>
@@ -13613,7 +13613,7 @@
         </p:blipFill>
         <p:spPr>
           <a:xfrm rot="5400000">
-            <a:off x="6928738" y="440625"/>
+            <a:off x="951993" y="440624"/>
             <a:ext cx="4311269" cy="5976747"/>
           </a:xfrm>
           <a:prstGeom prst="rect">
@@ -13779,10 +13779,10 @@
       </p:sp>
       <p:pic>
         <p:nvPicPr>
-          <p:cNvPr id="4" name="Picture 3">
+          <p:cNvPr id="8" name="Picture 7">
             <a:extLst>
               <a:ext uri="{FF2B5EF4-FFF2-40B4-BE49-F238E27FC236}">
-                <a16:creationId xmlns:a16="http://schemas.microsoft.com/office/drawing/2014/main" id="{CBA9ADF3-9813-BF43-9336-5CD24ACD662B}"/>
+                <a16:creationId xmlns:a16="http://schemas.microsoft.com/office/drawing/2014/main" id="{17A0435A-C960-4144-8E13-DD79BD4982E1}"/>
               </a:ext>
             </a:extLst>
           </p:cNvPr>
@@ -13799,7 +13799,7 @@
         </p:blipFill>
         <p:spPr>
           <a:xfrm rot="5400000">
-            <a:off x="832739" y="440626"/>
+            <a:off x="6902475" y="440625"/>
             <a:ext cx="4311269" cy="5976747"/>
           </a:xfrm>
           <a:prstGeom prst="rect">
@@ -13809,10 +13809,10 @@
       </p:pic>
       <p:pic>
         <p:nvPicPr>
-          <p:cNvPr id="8" name="Picture 7">
+          <p:cNvPr id="5" name="Picture 4">
             <a:extLst>
               <a:ext uri="{FF2B5EF4-FFF2-40B4-BE49-F238E27FC236}">
-                <a16:creationId xmlns:a16="http://schemas.microsoft.com/office/drawing/2014/main" id="{17A0435A-C960-4144-8E13-DD79BD4982E1}"/>
+                <a16:creationId xmlns:a16="http://schemas.microsoft.com/office/drawing/2014/main" id="{836E63F5-7630-5045-AE19-817FAC1BAF0C}"/>
               </a:ext>
             </a:extLst>
           </p:cNvPr>
@@ -13829,7 +13829,7 @@
         </p:blipFill>
         <p:spPr>
           <a:xfrm rot="5400000">
-            <a:off x="6902475" y="440625"/>
+            <a:off x="925728" y="440624"/>
             <a:ext cx="4311269" cy="5976747"/>
           </a:xfrm>
           <a:prstGeom prst="rect">
@@ -17951,7 +17951,7 @@
           <a:p>
             <a:fld id="{3DBB7BD0-9B8D-1F47-8ABF-BE3CF9BD2848}" type="datetime1">
               <a:rPr lang="en-US" smtClean="0"/>
-              <a:t>9/29/20</a:t>
+              <a:t>9/30/20</a:t>
             </a:fld>
             <a:endParaRPr lang="en-US" dirty="0"/>
           </a:p>
@@ -20315,7 +20315,7 @@
           </a:prstGeom>
           <a:extLst>
             <a:ext uri="{C572A759-6A51-4108-AA02-DFA0A04FC94B}">
-              <ma14:wrappingTextBoxFlag xmlns:ma14="http://schemas.microsoft.com/office/mac/drawingml/2011/main" xmlns:a14="http://schemas.microsoft.com/office/drawing/2010/main" xmlns:m="http://schemas.openxmlformats.org/officeDocument/2006/math" xmlns="" val="1"/>
+              <ma14:wrappingTextBoxFlag xmlns="" xmlns:m="http://schemas.openxmlformats.org/officeDocument/2006/math" xmlns:a14="http://schemas.microsoft.com/office/drawing/2010/main" xmlns:ma14="http://schemas.microsoft.com/office/mac/drawingml/2011/main" val="1"/>
             </a:ext>
           </a:extLst>
         </p:spPr>
@@ -20497,7 +20497,7 @@
             <a:effectLst/>
             <a:extLst>
               <a:ext uri="{C572A759-6A51-4108-AA02-DFA0A04FC94B}">
-                <ma14:wrappingTextBoxFlag xmlns:ma14="http://schemas.microsoft.com/office/mac/drawingml/2011/main" xmlns:a14="http://schemas.microsoft.com/office/drawing/2010/main" xmlns:m="http://schemas.openxmlformats.org/officeDocument/2006/math" xmlns="" val="1"/>
+                <ma14:wrappingTextBoxFlag xmlns="" xmlns:m="http://schemas.openxmlformats.org/officeDocument/2006/math" xmlns:a14="http://schemas.microsoft.com/office/drawing/2010/main" xmlns:ma14="http://schemas.microsoft.com/office/mac/drawingml/2011/main" val="1"/>
               </a:ext>
             </a:extLst>
           </p:spPr>
@@ -20696,7 +20696,7 @@
             <a:effectLst/>
             <a:extLst>
               <a:ext uri="{C572A759-6A51-4108-AA02-DFA0A04FC94B}">
-                <ma14:wrappingTextBoxFlag xmlns:ma14="http://schemas.microsoft.com/office/mac/drawingml/2011/main" xmlns:a14="http://schemas.microsoft.com/office/drawing/2010/main" xmlns:m="http://schemas.openxmlformats.org/officeDocument/2006/math" xmlns="" val="1"/>
+                <ma14:wrappingTextBoxFlag xmlns="" xmlns:m="http://schemas.openxmlformats.org/officeDocument/2006/math" xmlns:a14="http://schemas.microsoft.com/office/drawing/2010/main" xmlns:ma14="http://schemas.microsoft.com/office/mac/drawingml/2011/main" val="1"/>
               </a:ext>
             </a:extLst>
           </p:spPr>
@@ -20887,7 +20887,7 @@
             <a:effectLst/>
             <a:extLst>
               <a:ext uri="{C572A759-6A51-4108-AA02-DFA0A04FC94B}">
-                <ma14:wrappingTextBoxFlag xmlns:ma14="http://schemas.microsoft.com/office/mac/drawingml/2011/main" xmlns:a14="http://schemas.microsoft.com/office/drawing/2010/main" xmlns:m="http://schemas.openxmlformats.org/officeDocument/2006/math" xmlns="" val="1"/>
+                <ma14:wrappingTextBoxFlag xmlns="" xmlns:m="http://schemas.openxmlformats.org/officeDocument/2006/math" xmlns:a14="http://schemas.microsoft.com/office/drawing/2010/main" xmlns:ma14="http://schemas.microsoft.com/office/mac/drawingml/2011/main" val="1"/>
               </a:ext>
             </a:extLst>
           </p:spPr>
@@ -21016,7 +21016,7 @@
             <a:effectLst/>
             <a:extLst>
               <a:ext uri="{C572A759-6A51-4108-AA02-DFA0A04FC94B}">
-                <ma14:wrappingTextBoxFlag xmlns:ma14="http://schemas.microsoft.com/office/mac/drawingml/2011/main" xmlns:a14="http://schemas.microsoft.com/office/drawing/2010/main" xmlns:m="http://schemas.openxmlformats.org/officeDocument/2006/math" xmlns="" val="1"/>
+                <ma14:wrappingTextBoxFlag xmlns="" xmlns:m="http://schemas.openxmlformats.org/officeDocument/2006/math" xmlns:a14="http://schemas.microsoft.com/office/drawing/2010/main" xmlns:ma14="http://schemas.microsoft.com/office/mac/drawingml/2011/main" val="1"/>
               </a:ext>
             </a:extLst>
           </p:spPr>
@@ -21097,7 +21097,7 @@
           </a:ln>
           <a:extLst>
             <a:ext uri="{C572A759-6A51-4108-AA02-DFA0A04FC94B}">
-              <ma14:wrappingTextBoxFlag xmlns:ma14="http://schemas.microsoft.com/office/mac/drawingml/2011/main" xmlns:a14="http://schemas.microsoft.com/office/drawing/2010/main" xmlns:m="http://schemas.openxmlformats.org/officeDocument/2006/math" xmlns="" val="1"/>
+              <ma14:wrappingTextBoxFlag xmlns="" xmlns:m="http://schemas.openxmlformats.org/officeDocument/2006/math" xmlns:a14="http://schemas.microsoft.com/office/drawing/2010/main" xmlns:ma14="http://schemas.microsoft.com/office/mac/drawingml/2011/main" val="1"/>
             </a:ext>
           </a:extLst>
         </p:spPr>
@@ -21143,7 +21143,7 @@
           </a:ln>
           <a:extLst>
             <a:ext uri="{C572A759-6A51-4108-AA02-DFA0A04FC94B}">
-              <ma14:wrappingTextBoxFlag xmlns:ma14="http://schemas.microsoft.com/office/mac/drawingml/2011/main" xmlns:a14="http://schemas.microsoft.com/office/drawing/2010/main" xmlns:m="http://schemas.openxmlformats.org/officeDocument/2006/math" xmlns="" val="1"/>
+              <ma14:wrappingTextBoxFlag xmlns="" xmlns:m="http://schemas.openxmlformats.org/officeDocument/2006/math" xmlns:a14="http://schemas.microsoft.com/office/drawing/2010/main" xmlns:ma14="http://schemas.microsoft.com/office/mac/drawingml/2011/main" val="1"/>
             </a:ext>
           </a:extLst>
         </p:spPr>
@@ -25034,7 +25034,7 @@
           <a:p>
             <a:fld id="{3DBB7BD0-9B8D-1F47-8ABF-BE3CF9BD2848}" type="datetime1">
               <a:rPr lang="en-US" smtClean="0"/>
-              <a:t>9/29/20</a:t>
+              <a:t>9/30/20</a:t>
             </a:fld>
             <a:endParaRPr lang="en-US" dirty="0"/>
           </a:p>
@@ -25185,7 +25185,7 @@
           <a:p>
             <a:fld id="{3DBB7BD0-9B8D-1F47-8ABF-BE3CF9BD2848}" type="datetime1">
               <a:rPr lang="en-US" smtClean="0"/>
-              <a:t>9/29/20</a:t>
+              <a:t>9/30/20</a:t>
             </a:fld>
             <a:endParaRPr lang="en-US" dirty="0"/>
           </a:p>
@@ -26038,7 +26038,7 @@
           <a:p>
             <a:fld id="{F7AFF6A5-F1FB-284A-BF72-2836D5A0B341}" type="datetime1">
               <a:rPr lang="en-US" smtClean="0"/>
-              <a:t>9/29/20</a:t>
+              <a:t>9/30/20</a:t>
             </a:fld>
             <a:endParaRPr lang="en-US" dirty="0"/>
           </a:p>
@@ -27178,7 +27178,7 @@
           <a:p>
             <a:fld id="{3DBB7BD0-9B8D-1F47-8ABF-BE3CF9BD2848}" type="datetime1">
               <a:rPr lang="en-US" smtClean="0"/>
-              <a:t>9/29/20</a:t>
+              <a:t>9/30/20</a:t>
             </a:fld>
             <a:endParaRPr lang="en-US" dirty="0"/>
           </a:p>
@@ -29336,7 +29336,7 @@
           <a:p>
             <a:fld id="{3DBB7BD0-9B8D-1F47-8ABF-BE3CF9BD2848}" type="datetime1">
               <a:rPr lang="en-US" smtClean="0"/>
-              <a:t>9/29/20</a:t>
+              <a:t>9/30/20</a:t>
             </a:fld>
             <a:endParaRPr lang="en-US" dirty="0"/>
           </a:p>
@@ -29632,7 +29632,7 @@
           <a:p>
             <a:fld id="{D52D66B2-0E0A-F441-A1DA-8039F615D612}" type="datetime1">
               <a:rPr lang="en-US" smtClean="0"/>
-              <a:t>9/29/20</a:t>
+              <a:t>9/30/20</a:t>
             </a:fld>
             <a:endParaRPr lang="en-US" dirty="0"/>
           </a:p>
@@ -30171,7 +30171,7 @@
           <a:p>
             <a:fld id="{D52D66B2-0E0A-F441-A1DA-8039F615D612}" type="datetime1">
               <a:rPr lang="en-US" smtClean="0"/>
-              <a:t>9/29/20</a:t>
+              <a:t>9/30/20</a:t>
             </a:fld>
             <a:endParaRPr lang="en-US" dirty="0"/>
           </a:p>
@@ -31572,7 +31572,7 @@
           <a:p>
             <a:fld id="{3DBB7BD0-9B8D-1F47-8ABF-BE3CF9BD2848}" type="datetime1">
               <a:rPr lang="en-US" smtClean="0"/>
-              <a:t>9/29/20</a:t>
+              <a:t>9/30/20</a:t>
             </a:fld>
             <a:endParaRPr lang="en-US" dirty="0"/>
           </a:p>
@@ -32192,7 +32192,7 @@
           <a:p>
             <a:fld id="{3DBB7BD0-9B8D-1F47-8ABF-BE3CF9BD2848}" type="datetime1">
               <a:rPr lang="en-US" smtClean="0"/>
-              <a:t>9/29/20</a:t>
+              <a:t>9/30/20</a:t>
             </a:fld>
             <a:endParaRPr lang="en-US" dirty="0"/>
           </a:p>
@@ -32910,7 +32910,7 @@
           <a:p>
             <a:fld id="{3DBB7BD0-9B8D-1F47-8ABF-BE3CF9BD2848}" type="datetime1">
               <a:rPr lang="en-US" smtClean="0"/>
-              <a:t>9/29/20</a:t>
+              <a:t>9/30/20</a:t>
             </a:fld>
             <a:endParaRPr lang="en-US" dirty="0"/>
           </a:p>
@@ -33789,7 +33789,7 @@
           <a:p>
             <a:fld id="{3DBB7BD0-9B8D-1F47-8ABF-BE3CF9BD2848}" type="datetime1">
               <a:rPr lang="en-US" smtClean="0"/>
-              <a:t>9/29/20</a:t>
+              <a:t>9/30/20</a:t>
             </a:fld>
             <a:endParaRPr lang="en-US" dirty="0"/>
           </a:p>
@@ -34575,7 +34575,7 @@
           <a:p>
             <a:fld id="{3DBB7BD0-9B8D-1F47-8ABF-BE3CF9BD2848}" type="datetime1">
               <a:rPr lang="en-US" smtClean="0"/>
-              <a:t>9/29/20</a:t>
+              <a:t>9/30/20</a:t>
             </a:fld>
             <a:endParaRPr lang="en-US" dirty="0"/>
           </a:p>

</xml_diff>